<commit_message>
Small changes to final presentation
</commit_message>
<xml_diff>
--- a/presentations/20160128 Final presentation/WebRTC_Final.pptx
+++ b/presentations/20160128 Final presentation/WebRTC_Final.pptx
@@ -5,7 +5,7 @@
     <p:sldMasterId id="2147483648" r:id="rId1"/>
   </p:sldMasterIdLst>
   <p:notesMasterIdLst>
-    <p:notesMasterId r:id="rId9"/>
+    <p:notesMasterId r:id="rId10"/>
   </p:notesMasterIdLst>
   <p:sldIdLst>
     <p:sldId id="263" r:id="rId2"/>
@@ -14,7 +14,8 @@
     <p:sldId id="270" r:id="rId5"/>
     <p:sldId id="273" r:id="rId6"/>
     <p:sldId id="276" r:id="rId7"/>
-    <p:sldId id="269" r:id="rId8"/>
+    <p:sldId id="277" r:id="rId8"/>
+    <p:sldId id="269" r:id="rId9"/>
   </p:sldIdLst>
   <p:sldSz cx="9144000" cy="6858000" type="screen4x3"/>
   <p:notesSz cx="6858000" cy="9144000"/>
@@ -115,7 +116,7 @@
   </p:defaultTextStyle>
   <p:extLst>
     <p:ext uri="{EFAFB233-063F-42B5-8137-9DF3F51BA10A}">
-      <p15:sldGuideLst xmlns="" xmlns:p15="http://schemas.microsoft.com/office/powerpoint/2012/main">
+      <p15:sldGuideLst xmlns:p15="http://schemas.microsoft.com/office/powerpoint/2012/main" xmlns="">
         <p15:guide id="1" orient="horz" pos="1002">
           <p15:clr>
             <a:srgbClr val="A4A3A4"/>
@@ -214,7 +215,7 @@
           <a:p>
             <a:fld id="{7A19BEE0-598C-4858-A439-753E34679212}" type="datetimeFigureOut">
               <a:rPr lang="de-AT" smtClean="0"/>
-              <a:t>23.01.2016</a:t>
+              <a:t>25.01.2016</a:t>
             </a:fld>
             <a:endParaRPr lang="de-AT"/>
           </a:p>
@@ -1490,7 +1491,7 @@
           <a:bodyPr/>
           <a:lstStyle/>
           <a:p>
-            <a:endParaRPr lang="de-AT" dirty="0"/>
+            <a:endParaRPr lang="de-AT" baseline="0" dirty="0" smtClean="0"/>
           </a:p>
         </p:txBody>
       </p:sp>
@@ -1512,6 +1513,90 @@
             <a:fld id="{2AFEA223-4F50-4DD6-9CC4-15E4F51256E0}" type="slidenum">
               <a:rPr lang="de-AT" smtClean="0"/>
               <a:t>7</a:t>
+            </a:fld>
+            <a:endParaRPr lang="de-AT"/>
+          </a:p>
+        </p:txBody>
+      </p:sp>
+    </p:spTree>
+    <p:extLst>
+      <p:ext uri="{BB962C8B-B14F-4D97-AF65-F5344CB8AC3E}">
+        <p14:creationId xmlns:p14="http://schemas.microsoft.com/office/powerpoint/2010/main" val="1102681854"/>
+      </p:ext>
+    </p:extLst>
+  </p:cSld>
+  <p:clrMapOvr>
+    <a:masterClrMapping/>
+  </p:clrMapOvr>
+</p:notes>
+</file>
+
+<file path=ppt/notesSlides/notesSlide7.xml><?xml version="1.0" encoding="utf-8"?>
+<p:notes xmlns:a="http://schemas.openxmlformats.org/drawingml/2006/main" xmlns:r="http://schemas.openxmlformats.org/officeDocument/2006/relationships" xmlns:p="http://schemas.openxmlformats.org/presentationml/2006/main">
+  <p:cSld>
+    <p:spTree>
+      <p:nvGrpSpPr>
+        <p:cNvPr id="1" name=""/>
+        <p:cNvGrpSpPr/>
+        <p:nvPr/>
+      </p:nvGrpSpPr>
+      <p:grpSpPr>
+        <a:xfrm>
+          <a:off x="0" y="0"/>
+          <a:ext cx="0" cy="0"/>
+          <a:chOff x="0" y="0"/>
+          <a:chExt cx="0" cy="0"/>
+        </a:xfrm>
+      </p:grpSpPr>
+      <p:sp>
+        <p:nvSpPr>
+          <p:cNvPr id="2" name="Folienbildplatzhalter 1"/>
+          <p:cNvSpPr>
+            <a:spLocks noGrp="1" noRot="1" noChangeAspect="1"/>
+          </p:cNvSpPr>
+          <p:nvPr>
+            <p:ph type="sldImg"/>
+          </p:nvPr>
+        </p:nvSpPr>
+        <p:spPr/>
+      </p:sp>
+      <p:sp>
+        <p:nvSpPr>
+          <p:cNvPr id="3" name="Notizenplatzhalter 2"/>
+          <p:cNvSpPr>
+            <a:spLocks noGrp="1"/>
+          </p:cNvSpPr>
+          <p:nvPr>
+            <p:ph type="body" idx="1"/>
+          </p:nvPr>
+        </p:nvSpPr>
+        <p:spPr/>
+        <p:txBody>
+          <a:bodyPr/>
+          <a:lstStyle/>
+          <a:p>
+            <a:endParaRPr lang="de-AT" dirty="0"/>
+          </a:p>
+        </p:txBody>
+      </p:sp>
+      <p:sp>
+        <p:nvSpPr>
+          <p:cNvPr id="4" name="Foliennummernplatzhalter 3"/>
+          <p:cNvSpPr>
+            <a:spLocks noGrp="1"/>
+          </p:cNvSpPr>
+          <p:nvPr>
+            <p:ph type="sldNum" sz="quarter" idx="10"/>
+          </p:nvPr>
+        </p:nvSpPr>
+        <p:spPr/>
+        <p:txBody>
+          <a:bodyPr/>
+          <a:lstStyle/>
+          <a:p>
+            <a:fld id="{2AFEA223-4F50-4DD6-9CC4-15E4F51256E0}" type="slidenum">
+              <a:rPr lang="de-AT" smtClean="0"/>
+              <a:t>8</a:t>
             </a:fld>
             <a:endParaRPr lang="de-AT"/>
           </a:p>
@@ -1862,7 +1947,7 @@
           <a:p>
             <a:fld id="{BD334F44-700B-E44C-96AB-E83A6820DFD3}" type="datetimeFigureOut">
               <a:rPr lang="de-DE" smtClean="0"/>
-              <a:t>23.01.2016</a:t>
+              <a:t>25.01.2016</a:t>
             </a:fld>
             <a:endParaRPr lang="de-DE"/>
           </a:p>
@@ -2042,7 +2127,7 @@
           <a:p>
             <a:fld id="{BD334F44-700B-E44C-96AB-E83A6820DFD3}" type="datetimeFigureOut">
               <a:rPr lang="de-DE" smtClean="0"/>
-              <a:t>23.01.2016</a:t>
+              <a:t>25.01.2016</a:t>
             </a:fld>
             <a:endParaRPr lang="de-DE"/>
           </a:p>
@@ -2212,7 +2297,7 @@
           <a:p>
             <a:fld id="{BD334F44-700B-E44C-96AB-E83A6820DFD3}" type="datetimeFigureOut">
               <a:rPr lang="de-DE" smtClean="0"/>
-              <a:t>23.01.2016</a:t>
+              <a:t>25.01.2016</a:t>
             </a:fld>
             <a:endParaRPr lang="de-DE"/>
           </a:p>
@@ -2458,7 +2543,7 @@
           <a:p>
             <a:fld id="{BD334F44-700B-E44C-96AB-E83A6820DFD3}" type="datetimeFigureOut">
               <a:rPr lang="de-DE" smtClean="0"/>
-              <a:t>23.01.2016</a:t>
+              <a:t>25.01.2016</a:t>
             </a:fld>
             <a:endParaRPr lang="de-DE"/>
           </a:p>
@@ -2746,7 +2831,7 @@
           <a:p>
             <a:fld id="{BD334F44-700B-E44C-96AB-E83A6820DFD3}" type="datetimeFigureOut">
               <a:rPr lang="de-DE" smtClean="0"/>
-              <a:t>23.01.2016</a:t>
+              <a:t>25.01.2016</a:t>
             </a:fld>
             <a:endParaRPr lang="de-DE"/>
           </a:p>
@@ -3168,7 +3253,7 @@
           <a:p>
             <a:fld id="{BD334F44-700B-E44C-96AB-E83A6820DFD3}" type="datetimeFigureOut">
               <a:rPr lang="de-DE" smtClean="0"/>
-              <a:t>23.01.2016</a:t>
+              <a:t>25.01.2016</a:t>
             </a:fld>
             <a:endParaRPr lang="de-DE"/>
           </a:p>
@@ -3286,7 +3371,7 @@
           <a:p>
             <a:fld id="{BD334F44-700B-E44C-96AB-E83A6820DFD3}" type="datetimeFigureOut">
               <a:rPr lang="de-DE" smtClean="0"/>
-              <a:t>23.01.2016</a:t>
+              <a:t>25.01.2016</a:t>
             </a:fld>
             <a:endParaRPr lang="de-DE"/>
           </a:p>
@@ -3381,7 +3466,7 @@
           <a:p>
             <a:fld id="{BD334F44-700B-E44C-96AB-E83A6820DFD3}" type="datetimeFigureOut">
               <a:rPr lang="de-DE" smtClean="0"/>
-              <a:t>23.01.2016</a:t>
+              <a:t>25.01.2016</a:t>
             </a:fld>
             <a:endParaRPr lang="de-DE"/>
           </a:p>
@@ -3704,7 +3789,7 @@
           <a:p>
             <a:fld id="{BD334F44-700B-E44C-96AB-E83A6820DFD3}" type="datetimeFigureOut">
               <a:rPr lang="de-DE" smtClean="0"/>
-              <a:t>23.01.2016</a:t>
+              <a:t>25.01.2016</a:t>
             </a:fld>
             <a:endParaRPr lang="de-DE"/>
           </a:p>
@@ -3957,7 +4042,7 @@
           <a:p>
             <a:fld id="{BD334F44-700B-E44C-96AB-E83A6820DFD3}" type="datetimeFigureOut">
               <a:rPr lang="de-DE" smtClean="0"/>
-              <a:t>23.01.2016</a:t>
+              <a:t>25.01.2016</a:t>
             </a:fld>
             <a:endParaRPr lang="de-DE"/>
           </a:p>
@@ -4170,7 +4255,7 @@
           <a:p>
             <a:fld id="{BD334F44-700B-E44C-96AB-E83A6820DFD3}" type="datetimeFigureOut">
               <a:rPr lang="de-DE" smtClean="0"/>
-              <a:t>23.01.2016</a:t>
+              <a:t>25.01.2016</a:t>
             </a:fld>
             <a:endParaRPr lang="de-DE"/>
           </a:p>
@@ -4786,8 +4871,8 @@
         </p:blipFill>
         <p:spPr bwMode="auto">
           <a:xfrm>
-            <a:off x="1708706" y="1510852"/>
-            <a:ext cx="5530294" cy="3871208"/>
+            <a:off x="2455466" y="2650804"/>
+            <a:ext cx="4097734" cy="2868415"/>
           </a:xfrm>
           <a:prstGeom prst="rect">
             <a:avLst/>
@@ -4804,6 +4889,140 @@
           </a:extLst>
         </p:spPr>
       </p:pic>
+      <p:sp>
+        <p:nvSpPr>
+          <p:cNvPr id="2" name="Textfeld 1"/>
+          <p:cNvSpPr txBox="1"/>
+          <p:nvPr/>
+        </p:nvSpPr>
+        <p:spPr>
+          <a:xfrm>
+            <a:off x="320040" y="1323350"/>
+            <a:ext cx="8473440" cy="861774"/>
+          </a:xfrm>
+          <a:prstGeom prst="rect">
+            <a:avLst/>
+          </a:prstGeom>
+          <a:noFill/>
+        </p:spPr>
+        <p:txBody>
+          <a:bodyPr wrap="square" rtlCol="0">
+            <a:spAutoFit/>
+          </a:bodyPr>
+          <a:lstStyle/>
+          <a:p>
+            <a:pPr algn="ctr"/>
+            <a:r>
+              <a:rPr lang="de-AT" sz="3000" b="1" dirty="0" smtClean="0">
+                <a:solidFill>
+                  <a:srgbClr val="76B82A"/>
+                </a:solidFill>
+              </a:rPr>
+              <a:t>Will </a:t>
+            </a:r>
+            <a:r>
+              <a:rPr lang="de-AT" sz="3000" b="1" dirty="0" err="1" smtClean="0">
+                <a:solidFill>
+                  <a:srgbClr val="76B82A"/>
+                </a:solidFill>
+              </a:rPr>
+              <a:t>WebRTC</a:t>
+            </a:r>
+            <a:r>
+              <a:rPr lang="de-AT" sz="3000" b="1" dirty="0" smtClean="0">
+                <a:solidFill>
+                  <a:srgbClr val="76B82A"/>
+                </a:solidFill>
+              </a:rPr>
+              <a:t> </a:t>
+            </a:r>
+            <a:r>
+              <a:rPr lang="de-AT" sz="3000" b="1" dirty="0" err="1" smtClean="0">
+                <a:solidFill>
+                  <a:srgbClr val="76B82A"/>
+                </a:solidFill>
+              </a:rPr>
+              <a:t>change</a:t>
+            </a:r>
+            <a:r>
+              <a:rPr lang="de-AT" sz="3000" b="1" dirty="0" smtClean="0">
+                <a:solidFill>
+                  <a:srgbClr val="76B82A"/>
+                </a:solidFill>
+              </a:rPr>
+              <a:t> </a:t>
+            </a:r>
+            <a:r>
+              <a:rPr lang="de-AT" sz="3000" b="1" dirty="0" err="1" smtClean="0">
+                <a:solidFill>
+                  <a:srgbClr val="76B82A"/>
+                </a:solidFill>
+              </a:rPr>
+              <a:t>the</a:t>
+            </a:r>
+            <a:r>
+              <a:rPr lang="de-AT" sz="3000" b="1" dirty="0" smtClean="0">
+                <a:solidFill>
+                  <a:srgbClr val="76B82A"/>
+                </a:solidFill>
+              </a:rPr>
+              <a:t> </a:t>
+            </a:r>
+            <a:r>
+              <a:rPr lang="de-AT" sz="3000" b="1" dirty="0" err="1" smtClean="0">
+                <a:solidFill>
+                  <a:srgbClr val="76B82A"/>
+                </a:solidFill>
+              </a:rPr>
+              <a:t>world</a:t>
+            </a:r>
+            <a:r>
+              <a:rPr lang="de-AT" sz="3000" b="1" dirty="0" smtClean="0">
+                <a:solidFill>
+                  <a:srgbClr val="76B82A"/>
+                </a:solidFill>
+              </a:rPr>
+              <a:t> </a:t>
+            </a:r>
+            <a:r>
+              <a:rPr lang="de-AT" sz="3000" b="1" dirty="0" err="1" smtClean="0">
+                <a:solidFill>
+                  <a:srgbClr val="76B82A"/>
+                </a:solidFill>
+              </a:rPr>
+              <a:t>of</a:t>
+            </a:r>
+            <a:r>
+              <a:rPr lang="de-AT" sz="3000" b="1" dirty="0" smtClean="0">
+                <a:solidFill>
+                  <a:srgbClr val="76B82A"/>
+                </a:solidFill>
+              </a:rPr>
+              <a:t> </a:t>
+            </a:r>
+            <a:r>
+              <a:rPr lang="de-AT" sz="3000" b="1" dirty="0" err="1" smtClean="0">
+                <a:solidFill>
+                  <a:srgbClr val="76B82A"/>
+                </a:solidFill>
+              </a:rPr>
+              <a:t>communications</a:t>
+            </a:r>
+            <a:r>
+              <a:rPr lang="de-AT" sz="3000" b="1" dirty="0" smtClean="0">
+                <a:solidFill>
+                  <a:srgbClr val="76B82A"/>
+                </a:solidFill>
+              </a:rPr>
+              <a:t>?</a:t>
+            </a:r>
+          </a:p>
+          <a:p>
+            <a:pPr algn="r"/>
+            <a:endParaRPr lang="de-AT" sz="2000" b="1" dirty="0" smtClean="0"/>
+          </a:p>
+        </p:txBody>
+      </p:sp>
     </p:spTree>
     <p:extLst>
       <p:ext uri="{BB962C8B-B14F-4D97-AF65-F5344CB8AC3E}">
@@ -7174,6 +7393,297 @@
           <a:chExt cx="0" cy="0"/>
         </a:xfrm>
       </p:grpSpPr>
+      <p:pic>
+        <p:nvPicPr>
+          <p:cNvPr id="1028" name="Picture 4" descr="http://www.telepresenceoptions.com/images/WebRTC_Logo.png"/>
+          <p:cNvPicPr>
+            <a:picLocks noChangeAspect="1" noChangeArrowheads="1"/>
+          </p:cNvPicPr>
+          <p:nvPr/>
+        </p:nvPicPr>
+        <p:blipFill>
+          <a:blip r:embed="rId3">
+            <a:extLst>
+              <a:ext uri="{28A0092B-C50C-407E-A947-70E740481C1C}">
+                <a14:useLocalDpi xmlns:a14="http://schemas.microsoft.com/office/drawing/2010/main" val="0"/>
+              </a:ext>
+            </a:extLst>
+          </a:blip>
+          <a:srcRect/>
+          <a:stretch>
+            <a:fillRect/>
+          </a:stretch>
+        </p:blipFill>
+        <p:spPr bwMode="auto">
+          <a:xfrm>
+            <a:off x="2455466" y="2650804"/>
+            <a:ext cx="4097734" cy="2868415"/>
+          </a:xfrm>
+          <a:prstGeom prst="rect">
+            <a:avLst/>
+          </a:prstGeom>
+          <a:noFill/>
+          <a:extLst>
+            <a:ext uri="{909E8E84-426E-40DD-AFC4-6F175D3DCCD1}">
+              <a14:hiddenFill xmlns:a14="http://schemas.microsoft.com/office/drawing/2010/main">
+                <a:solidFill>
+                  <a:srgbClr val="FFFFFF"/>
+                </a:solidFill>
+              </a14:hiddenFill>
+            </a:ext>
+          </a:extLst>
+        </p:spPr>
+      </p:pic>
+      <p:sp>
+        <p:nvSpPr>
+          <p:cNvPr id="2" name="Textfeld 1"/>
+          <p:cNvSpPr txBox="1"/>
+          <p:nvPr/>
+        </p:nvSpPr>
+        <p:spPr>
+          <a:xfrm>
+            <a:off x="320040" y="1323350"/>
+            <a:ext cx="8473440" cy="861774"/>
+          </a:xfrm>
+          <a:prstGeom prst="rect">
+            <a:avLst/>
+          </a:prstGeom>
+          <a:noFill/>
+        </p:spPr>
+        <p:txBody>
+          <a:bodyPr wrap="square" rtlCol="0">
+            <a:spAutoFit/>
+          </a:bodyPr>
+          <a:lstStyle/>
+          <a:p>
+            <a:pPr algn="ctr"/>
+            <a:r>
+              <a:rPr lang="de-AT" sz="3000" b="1" dirty="0" smtClean="0">
+                <a:solidFill>
+                  <a:srgbClr val="76B82A"/>
+                </a:solidFill>
+              </a:rPr>
+              <a:t>Will </a:t>
+            </a:r>
+            <a:r>
+              <a:rPr lang="de-AT" sz="3000" b="1" dirty="0" err="1" smtClean="0">
+                <a:solidFill>
+                  <a:srgbClr val="76B82A"/>
+                </a:solidFill>
+              </a:rPr>
+              <a:t>WebRTC</a:t>
+            </a:r>
+            <a:r>
+              <a:rPr lang="de-AT" sz="3000" b="1" dirty="0" smtClean="0">
+                <a:solidFill>
+                  <a:srgbClr val="76B82A"/>
+                </a:solidFill>
+              </a:rPr>
+              <a:t> </a:t>
+            </a:r>
+            <a:r>
+              <a:rPr lang="de-AT" sz="3000" b="1" dirty="0" err="1" smtClean="0">
+                <a:solidFill>
+                  <a:srgbClr val="76B82A"/>
+                </a:solidFill>
+              </a:rPr>
+              <a:t>change</a:t>
+            </a:r>
+            <a:r>
+              <a:rPr lang="de-AT" sz="3000" b="1" dirty="0" smtClean="0">
+                <a:solidFill>
+                  <a:srgbClr val="76B82A"/>
+                </a:solidFill>
+              </a:rPr>
+              <a:t> </a:t>
+            </a:r>
+            <a:r>
+              <a:rPr lang="de-AT" sz="3000" b="1" dirty="0" err="1" smtClean="0">
+                <a:solidFill>
+                  <a:srgbClr val="76B82A"/>
+                </a:solidFill>
+              </a:rPr>
+              <a:t>the</a:t>
+            </a:r>
+            <a:r>
+              <a:rPr lang="de-AT" sz="3000" b="1" dirty="0" smtClean="0">
+                <a:solidFill>
+                  <a:srgbClr val="76B82A"/>
+                </a:solidFill>
+              </a:rPr>
+              <a:t> </a:t>
+            </a:r>
+            <a:r>
+              <a:rPr lang="de-AT" sz="3000" b="1" dirty="0" err="1" smtClean="0">
+                <a:solidFill>
+                  <a:srgbClr val="76B82A"/>
+                </a:solidFill>
+              </a:rPr>
+              <a:t>world</a:t>
+            </a:r>
+            <a:r>
+              <a:rPr lang="de-AT" sz="3000" b="1" dirty="0" smtClean="0">
+                <a:solidFill>
+                  <a:srgbClr val="76B82A"/>
+                </a:solidFill>
+              </a:rPr>
+              <a:t> </a:t>
+            </a:r>
+            <a:r>
+              <a:rPr lang="de-AT" sz="3000" b="1" dirty="0" err="1" smtClean="0">
+                <a:solidFill>
+                  <a:srgbClr val="76B82A"/>
+                </a:solidFill>
+              </a:rPr>
+              <a:t>of</a:t>
+            </a:r>
+            <a:r>
+              <a:rPr lang="de-AT" sz="3000" b="1" dirty="0" smtClean="0">
+                <a:solidFill>
+                  <a:srgbClr val="76B82A"/>
+                </a:solidFill>
+              </a:rPr>
+              <a:t> </a:t>
+            </a:r>
+            <a:r>
+              <a:rPr lang="de-AT" sz="3000" b="1" dirty="0" err="1" smtClean="0">
+                <a:solidFill>
+                  <a:srgbClr val="76B82A"/>
+                </a:solidFill>
+              </a:rPr>
+              <a:t>communications</a:t>
+            </a:r>
+            <a:r>
+              <a:rPr lang="de-AT" sz="3000" b="1" dirty="0" smtClean="0">
+                <a:solidFill>
+                  <a:srgbClr val="76B82A"/>
+                </a:solidFill>
+              </a:rPr>
+              <a:t>?</a:t>
+            </a:r>
+          </a:p>
+          <a:p>
+            <a:pPr algn="r"/>
+            <a:endParaRPr lang="de-AT" sz="2000" b="1" dirty="0" smtClean="0"/>
+          </a:p>
+        </p:txBody>
+      </p:sp>
+    </p:spTree>
+    <p:extLst>
+      <p:ext uri="{BB962C8B-B14F-4D97-AF65-F5344CB8AC3E}">
+        <p14:creationId xmlns:p14="http://schemas.microsoft.com/office/powerpoint/2010/main" val="1322694571"/>
+      </p:ext>
+    </p:extLst>
+  </p:cSld>
+  <p:clrMapOvr>
+    <a:masterClrMapping/>
+  </p:clrMapOvr>
+  <p:timing>
+    <p:tnLst>
+      <p:par>
+        <p:cTn id="1" dur="indefinite" restart="never" nodeType="tmRoot">
+          <p:childTnLst>
+            <p:seq concurrent="1" nextAc="seek">
+              <p:cTn id="2" dur="indefinite" nodeType="mainSeq">
+                <p:childTnLst>
+                  <p:par>
+                    <p:cTn id="3" fill="hold">
+                      <p:stCondLst>
+                        <p:cond delay="indefinite"/>
+                        <p:cond evt="onBegin" delay="0">
+                          <p:tn val="2"/>
+                        </p:cond>
+                      </p:stCondLst>
+                      <p:childTnLst>
+                        <p:par>
+                          <p:cTn id="4" fill="hold">
+                            <p:stCondLst>
+                              <p:cond delay="0"/>
+                            </p:stCondLst>
+                            <p:childTnLst>
+                              <p:par>
+                                <p:cTn id="5" presetID="10" presetClass="entr" presetSubtype="0" fill="hold" nodeType="withEffect">
+                                  <p:stCondLst>
+                                    <p:cond delay="500"/>
+                                  </p:stCondLst>
+                                  <p:childTnLst>
+                                    <p:set>
+                                      <p:cBhvr>
+                                        <p:cTn id="6" dur="1" fill="hold">
+                                          <p:stCondLst>
+                                            <p:cond delay="0"/>
+                                          </p:stCondLst>
+                                        </p:cTn>
+                                        <p:tgtEl>
+                                          <p:spTgt spid="1028"/>
+                                        </p:tgtEl>
+                                        <p:attrNameLst>
+                                          <p:attrName>style.visibility</p:attrName>
+                                        </p:attrNameLst>
+                                      </p:cBhvr>
+                                      <p:to>
+                                        <p:strVal val="visible"/>
+                                      </p:to>
+                                    </p:set>
+                                    <p:animEffect transition="in" filter="fade">
+                                      <p:cBhvr>
+                                        <p:cTn id="7" dur="500"/>
+                                        <p:tgtEl>
+                                          <p:spTgt spid="1028"/>
+                                        </p:tgtEl>
+                                      </p:cBhvr>
+                                    </p:animEffect>
+                                  </p:childTnLst>
+                                </p:cTn>
+                              </p:par>
+                            </p:childTnLst>
+                          </p:cTn>
+                        </p:par>
+                      </p:childTnLst>
+                    </p:cTn>
+                  </p:par>
+                </p:childTnLst>
+              </p:cTn>
+              <p:prevCondLst>
+                <p:cond evt="onPrev" delay="0">
+                  <p:tgtEl>
+                    <p:sldTgt/>
+                  </p:tgtEl>
+                </p:cond>
+              </p:prevCondLst>
+              <p:nextCondLst>
+                <p:cond evt="onNext" delay="0">
+                  <p:tgtEl>
+                    <p:sldTgt/>
+                  </p:tgtEl>
+                </p:cond>
+              </p:nextCondLst>
+            </p:seq>
+          </p:childTnLst>
+        </p:cTn>
+      </p:par>
+    </p:tnLst>
+  </p:timing>
+</p:sld>
+</file>
+
+<file path=ppt/slides/slide8.xml><?xml version="1.0" encoding="utf-8"?>
+<p:sld xmlns:a="http://schemas.openxmlformats.org/drawingml/2006/main" xmlns:r="http://schemas.openxmlformats.org/officeDocument/2006/relationships" xmlns:p="http://schemas.openxmlformats.org/presentationml/2006/main">
+  <p:cSld>
+    <p:spTree>
+      <p:nvGrpSpPr>
+        <p:cNvPr id="1" name=""/>
+        <p:cNvGrpSpPr/>
+        <p:nvPr/>
+      </p:nvGrpSpPr>
+      <p:grpSpPr>
+        <a:xfrm>
+          <a:off x="0" y="0"/>
+          <a:ext cx="0" cy="0"/>
+          <a:chOff x="0" y="0"/>
+          <a:chExt cx="0" cy="0"/>
+        </a:xfrm>
+      </p:grpSpPr>
       <p:sp>
         <p:nvSpPr>
           <p:cNvPr id="3" name="Textfeld 2"/>

</xml_diff>

<commit_message>
Preparation for final presentation
</commit_message>
<xml_diff>
--- a/presentations/20160128 Final presentation/WebRTC_Final.pptx
+++ b/presentations/20160128 Final presentation/WebRTC_Final.pptx
@@ -116,7 +116,7 @@
   </p:defaultTextStyle>
   <p:extLst>
     <p:ext uri="{EFAFB233-063F-42B5-8137-9DF3F51BA10A}">
-      <p15:sldGuideLst xmlns:p15="http://schemas.microsoft.com/office/powerpoint/2012/main" xmlns="">
+      <p15:sldGuideLst xmlns="" xmlns:p15="http://schemas.microsoft.com/office/powerpoint/2012/main">
         <p15:guide id="1" orient="horz" pos="1002">
           <p15:clr>
             <a:srgbClr val="A4A3A4"/>
@@ -5091,6 +5091,41 @@
                                   </p:childTnLst>
                                 </p:cTn>
                               </p:par>
+                              <p:par>
+                                <p:cTn id="8" presetID="10" presetClass="entr" presetSubtype="0" fill="hold" grpId="0" nodeType="withEffect">
+                                  <p:stCondLst>
+                                    <p:cond delay="500"/>
+                                  </p:stCondLst>
+                                  <p:childTnLst>
+                                    <p:set>
+                                      <p:cBhvr>
+                                        <p:cTn id="9" dur="1" fill="hold">
+                                          <p:stCondLst>
+                                            <p:cond delay="0"/>
+                                          </p:stCondLst>
+                                        </p:cTn>
+                                        <p:tgtEl>
+                                          <p:spTgt spid="2"/>
+                                        </p:tgtEl>
+                                        <p:attrNameLst>
+                                          <p:attrName>style.visibility</p:attrName>
+                                        </p:attrNameLst>
+                                      </p:cBhvr>
+                                      <p:to>
+                                        <p:strVal val="visible"/>
+                                      </p:to>
+                                    </p:set>
+                                    <p:animEffect transition="in" filter="fade">
+                                      <p:cBhvr>
+                                        <p:cTn id="10" dur="500"/>
+                                        <p:tgtEl>
+                                          <p:spTgt spid="2"/>
+                                        </p:tgtEl>
+                                      </p:cBhvr>
+                                    </p:animEffect>
+                                  </p:childTnLst>
+                                </p:cTn>
+                              </p:par>
                             </p:childTnLst>
                           </p:cTn>
                         </p:par>
@@ -5118,6 +5153,9 @@
         </p:cTn>
       </p:par>
     </p:tnLst>
+    <p:bldLst>
+      <p:bldP spid="2" grpId="0"/>
+    </p:bldLst>
   </p:timing>
 </p:sld>
 </file>
@@ -5616,7 +5654,7 @@
                                     </p:set>
                                     <p:animEffect transition="in" filter="fade">
                                       <p:cBhvr>
-                                        <p:cTn id="11" dur="500"/>
+                                        <p:cTn id="11" dur="250"/>
                                         <p:tgtEl>
                                           <p:spTgt spid="5"/>
                                         </p:tgtEl>
@@ -5681,30 +5719,21 @@
                             </p:childTnLst>
                           </p:cTn>
                         </p:par>
-                      </p:childTnLst>
-                    </p:cTn>
-                  </p:par>
-                  <p:par>
-                    <p:cTn id="17" fill="hold">
-                      <p:stCondLst>
-                        <p:cond delay="indefinite"/>
-                      </p:stCondLst>
-                      <p:childTnLst>
                         <p:par>
-                          <p:cTn id="18" fill="hold">
+                          <p:cTn id="17" fill="hold">
                             <p:stCondLst>
-                              <p:cond delay="0"/>
+                              <p:cond delay="500"/>
                             </p:stCondLst>
                             <p:childTnLst>
                               <p:par>
-                                <p:cTn id="19" presetID="10" presetClass="entr" presetSubtype="0" fill="hold" nodeType="clickEffect">
+                                <p:cTn id="18" presetID="10" presetClass="entr" presetSubtype="0" fill="hold" nodeType="afterEffect">
                                   <p:stCondLst>
                                     <p:cond delay="0"/>
                                   </p:stCondLst>
                                   <p:childTnLst>
                                     <p:set>
                                       <p:cBhvr>
-                                        <p:cTn id="20" dur="1" fill="hold">
+                                        <p:cTn id="19" dur="1" fill="hold">
                                           <p:stCondLst>
                                             <p:cond delay="0"/>
                                           </p:stCondLst>
@@ -5722,7 +5751,7 @@
                                     </p:set>
                                     <p:animEffect transition="in" filter="fade">
                                       <p:cBhvr>
-                                        <p:cTn id="21" dur="500"/>
+                                        <p:cTn id="20" dur="250"/>
                                         <p:tgtEl>
                                           <p:spTgt spid="3"/>
                                         </p:tgtEl>
@@ -5732,14 +5761,14 @@
                                 </p:cTn>
                               </p:par>
                               <p:par>
-                                <p:cTn id="22" presetID="10" presetClass="entr" presetSubtype="0" fill="hold" nodeType="withEffect">
+                                <p:cTn id="21" presetID="10" presetClass="entr" presetSubtype="0" fill="hold" nodeType="withEffect">
                                   <p:stCondLst>
                                     <p:cond delay="0"/>
                                   </p:stCondLst>
                                   <p:childTnLst>
                                     <p:set>
                                       <p:cBhvr>
-                                        <p:cTn id="23" dur="1" fill="hold">
+                                        <p:cTn id="22" dur="1" fill="hold">
                                           <p:stCondLst>
                                             <p:cond delay="0"/>
                                           </p:stCondLst>
@@ -5757,7 +5786,7 @@
                                     </p:set>
                                     <p:animEffect transition="in" filter="fade">
                                       <p:cBhvr>
-                                        <p:cTn id="24" dur="500"/>
+                                        <p:cTn id="23" dur="500"/>
                                         <p:tgtEl>
                                           <p:spTgt spid="7"/>
                                         </p:tgtEl>
@@ -5769,30 +5798,21 @@
                             </p:childTnLst>
                           </p:cTn>
                         </p:par>
-                      </p:childTnLst>
-                    </p:cTn>
-                  </p:par>
-                  <p:par>
-                    <p:cTn id="25" fill="hold">
-                      <p:stCondLst>
-                        <p:cond delay="indefinite"/>
-                      </p:stCondLst>
-                      <p:childTnLst>
                         <p:par>
-                          <p:cTn id="26" fill="hold">
+                          <p:cTn id="24" fill="hold">
                             <p:stCondLst>
-                              <p:cond delay="0"/>
+                              <p:cond delay="1000"/>
                             </p:stCondLst>
                             <p:childTnLst>
                               <p:par>
-                                <p:cTn id="27" presetID="10" presetClass="entr" presetSubtype="0" fill="hold" nodeType="clickEffect">
+                                <p:cTn id="25" presetID="10" presetClass="entr" presetSubtype="0" fill="hold" nodeType="afterEffect">
                                   <p:stCondLst>
                                     <p:cond delay="0"/>
                                   </p:stCondLst>
                                   <p:childTnLst>
                                     <p:set>
                                       <p:cBhvr>
-                                        <p:cTn id="28" dur="1" fill="hold">
+                                        <p:cTn id="26" dur="1" fill="hold">
                                           <p:stCondLst>
                                             <p:cond delay="0"/>
                                           </p:stCondLst>
@@ -5810,7 +5830,7 @@
                                     </p:set>
                                     <p:animEffect transition="in" filter="fade">
                                       <p:cBhvr>
-                                        <p:cTn id="29" dur="500"/>
+                                        <p:cTn id="27" dur="500"/>
                                         <p:tgtEl>
                                           <p:spTgt spid="10"/>
                                         </p:tgtEl>
@@ -5820,14 +5840,14 @@
                                 </p:cTn>
                               </p:par>
                               <p:par>
-                                <p:cTn id="30" presetID="10" presetClass="entr" presetSubtype="0" fill="hold" nodeType="withEffect">
+                                <p:cTn id="28" presetID="10" presetClass="entr" presetSubtype="0" fill="hold" nodeType="withEffect">
                                   <p:stCondLst>
                                     <p:cond delay="0"/>
                                   </p:stCondLst>
                                   <p:childTnLst>
                                     <p:set>
                                       <p:cBhvr>
-                                        <p:cTn id="31" dur="1" fill="hold">
+                                        <p:cTn id="29" dur="1" fill="hold">
                                           <p:stCondLst>
                                             <p:cond delay="0"/>
                                           </p:stCondLst>
@@ -5845,7 +5865,7 @@
                                     </p:set>
                                     <p:animEffect transition="in" filter="fade">
                                       <p:cBhvr>
-                                        <p:cTn id="32" dur="500"/>
+                                        <p:cTn id="30" dur="500"/>
                                         <p:tgtEl>
                                           <p:spTgt spid="12"/>
                                         </p:tgtEl>
@@ -5861,26 +5881,26 @@
                     </p:cTn>
                   </p:par>
                   <p:par>
-                    <p:cTn id="33" fill="hold">
+                    <p:cTn id="31" fill="hold">
                       <p:stCondLst>
                         <p:cond delay="indefinite"/>
                       </p:stCondLst>
                       <p:childTnLst>
                         <p:par>
-                          <p:cTn id="34" fill="hold">
+                          <p:cTn id="32" fill="hold">
                             <p:stCondLst>
                               <p:cond delay="0"/>
                             </p:stCondLst>
                             <p:childTnLst>
                               <p:par>
-                                <p:cTn id="35" presetID="10" presetClass="entr" presetSubtype="0" fill="hold" nodeType="clickEffect">
+                                <p:cTn id="33" presetID="10" presetClass="entr" presetSubtype="0" fill="hold" nodeType="clickEffect">
                                   <p:stCondLst>
                                     <p:cond delay="0"/>
                                   </p:stCondLst>
                                   <p:childTnLst>
                                     <p:set>
                                       <p:cBhvr>
-                                        <p:cTn id="36" dur="1" fill="hold">
+                                        <p:cTn id="34" dur="1" fill="hold">
                                           <p:stCondLst>
                                             <p:cond delay="0"/>
                                           </p:stCondLst>
@@ -5898,7 +5918,7 @@
                                     </p:set>
                                     <p:animEffect transition="in" filter="fade">
                                       <p:cBhvr>
-                                        <p:cTn id="37" dur="500"/>
+                                        <p:cTn id="35" dur="500"/>
                                         <p:tgtEl>
                                           <p:spTgt spid="11"/>
                                         </p:tgtEl>
@@ -5914,26 +5934,26 @@
                     </p:cTn>
                   </p:par>
                   <p:par>
-                    <p:cTn id="38" fill="hold">
+                    <p:cTn id="36" fill="hold">
                       <p:stCondLst>
                         <p:cond delay="indefinite"/>
                       </p:stCondLst>
                       <p:childTnLst>
                         <p:par>
-                          <p:cTn id="39" fill="hold">
+                          <p:cTn id="37" fill="hold">
                             <p:stCondLst>
                               <p:cond delay="0"/>
                             </p:stCondLst>
                             <p:childTnLst>
                               <p:par>
-                                <p:cTn id="40" presetID="10" presetClass="entr" presetSubtype="0" fill="hold" nodeType="clickEffect">
+                                <p:cTn id="38" presetID="10" presetClass="entr" presetSubtype="0" fill="hold" nodeType="clickEffect">
                                   <p:stCondLst>
                                     <p:cond delay="0"/>
                                   </p:stCondLst>
                                   <p:childTnLst>
                                     <p:set>
                                       <p:cBhvr>
-                                        <p:cTn id="41" dur="1" fill="hold">
+                                        <p:cTn id="39" dur="1" fill="hold">
                                           <p:stCondLst>
                                             <p:cond delay="0"/>
                                           </p:stCondLst>
@@ -5951,7 +5971,7 @@
                                     </p:set>
                                     <p:animEffect transition="in" filter="fade">
                                       <p:cBhvr>
-                                        <p:cTn id="42" dur="500"/>
+                                        <p:cTn id="40" dur="500"/>
                                         <p:tgtEl>
                                           <p:spTgt spid="18"/>
                                         </p:tgtEl>
@@ -5961,14 +5981,14 @@
                                 </p:cTn>
                               </p:par>
                               <p:par>
-                                <p:cTn id="43" presetID="10" presetClass="entr" presetSubtype="0" fill="hold" nodeType="withEffect">
+                                <p:cTn id="41" presetID="10" presetClass="entr" presetSubtype="0" fill="hold" nodeType="withEffect">
                                   <p:stCondLst>
                                     <p:cond delay="0"/>
                                   </p:stCondLst>
                                   <p:childTnLst>
                                     <p:set>
                                       <p:cBhvr>
-                                        <p:cTn id="44" dur="1" fill="hold">
+                                        <p:cTn id="42" dur="1" fill="hold">
                                           <p:stCondLst>
                                             <p:cond delay="0"/>
                                           </p:stCondLst>
@@ -5986,7 +6006,7 @@
                                     </p:set>
                                     <p:animEffect transition="in" filter="fade">
                                       <p:cBhvr>
-                                        <p:cTn id="45" dur="500"/>
+                                        <p:cTn id="43" dur="500"/>
                                         <p:tgtEl>
                                           <p:spTgt spid="20"/>
                                         </p:tgtEl>
@@ -5996,14 +6016,14 @@
                                 </p:cTn>
                               </p:par>
                               <p:par>
-                                <p:cTn id="46" presetID="10" presetClass="exit" presetSubtype="0" fill="hold" nodeType="withEffect">
+                                <p:cTn id="44" presetID="10" presetClass="exit" presetSubtype="0" fill="hold" nodeType="withEffect">
                                   <p:stCondLst>
                                     <p:cond delay="750"/>
                                   </p:stCondLst>
                                   <p:childTnLst>
                                     <p:animEffect transition="out" filter="fade">
                                       <p:cBhvr>
-                                        <p:cTn id="47" dur="500"/>
+                                        <p:cTn id="45" dur="500"/>
                                         <p:tgtEl>
                                           <p:spTgt spid="2050"/>
                                         </p:tgtEl>
@@ -6011,7 +6031,7 @@
                                     </p:animEffect>
                                     <p:set>
                                       <p:cBhvr>
-                                        <p:cTn id="48" dur="1" fill="hold">
+                                        <p:cTn id="46" dur="1" fill="hold">
                                           <p:stCondLst>
                                             <p:cond delay="499"/>
                                           </p:stCondLst>
@@ -6031,14 +6051,14 @@
                                 </p:cTn>
                               </p:par>
                               <p:par>
-                                <p:cTn id="49" presetID="10" presetClass="exit" presetSubtype="0" fill="hold" nodeType="withEffect">
+                                <p:cTn id="47" presetID="10" presetClass="exit" presetSubtype="0" fill="hold" nodeType="withEffect">
                                   <p:stCondLst>
                                     <p:cond delay="750"/>
                                   </p:stCondLst>
                                   <p:childTnLst>
                                     <p:animEffect transition="out" filter="fade">
                                       <p:cBhvr>
-                                        <p:cTn id="50" dur="500"/>
+                                        <p:cTn id="48" dur="500"/>
                                         <p:tgtEl>
                                           <p:spTgt spid="3"/>
                                         </p:tgtEl>
@@ -6046,7 +6066,7 @@
                                     </p:animEffect>
                                     <p:set>
                                       <p:cBhvr>
-                                        <p:cTn id="51" dur="1" fill="hold">
+                                        <p:cTn id="49" dur="1" fill="hold">
                                           <p:stCondLst>
                                             <p:cond delay="499"/>
                                           </p:stCondLst>
@@ -6066,14 +6086,14 @@
                                 </p:cTn>
                               </p:par>
                               <p:par>
-                                <p:cTn id="52" presetID="10" presetClass="exit" presetSubtype="0" fill="hold" nodeType="withEffect">
+                                <p:cTn id="50" presetID="10" presetClass="exit" presetSubtype="0" fill="hold" nodeType="withEffect">
                                   <p:stCondLst>
                                     <p:cond delay="750"/>
                                   </p:stCondLst>
                                   <p:childTnLst>
                                     <p:animEffect transition="out" filter="fade">
                                       <p:cBhvr>
-                                        <p:cTn id="53" dur="500"/>
+                                        <p:cTn id="51" dur="500"/>
                                         <p:tgtEl>
                                           <p:spTgt spid="7"/>
                                         </p:tgtEl>
@@ -6081,7 +6101,7 @@
                                     </p:animEffect>
                                     <p:set>
                                       <p:cBhvr>
-                                        <p:cTn id="54" dur="1" fill="hold">
+                                        <p:cTn id="52" dur="1" fill="hold">
                                           <p:stCondLst>
                                             <p:cond delay="499"/>
                                           </p:stCondLst>
@@ -6101,14 +6121,14 @@
                                 </p:cTn>
                               </p:par>
                               <p:par>
-                                <p:cTn id="55" presetID="10" presetClass="exit" presetSubtype="0" fill="hold" nodeType="withEffect">
+                                <p:cTn id="53" presetID="10" presetClass="exit" presetSubtype="0" fill="hold" nodeType="withEffect">
                                   <p:stCondLst>
                                     <p:cond delay="750"/>
                                   </p:stCondLst>
                                   <p:childTnLst>
                                     <p:animEffect transition="out" filter="fade">
                                       <p:cBhvr>
-                                        <p:cTn id="56" dur="500"/>
+                                        <p:cTn id="54" dur="500"/>
                                         <p:tgtEl>
                                           <p:spTgt spid="10"/>
                                         </p:tgtEl>
@@ -6116,7 +6136,7 @@
                                     </p:animEffect>
                                     <p:set>
                                       <p:cBhvr>
-                                        <p:cTn id="57" dur="1" fill="hold">
+                                        <p:cTn id="55" dur="1" fill="hold">
                                           <p:stCondLst>
                                             <p:cond delay="499"/>
                                           </p:stCondLst>
@@ -6136,14 +6156,14 @@
                                 </p:cTn>
                               </p:par>
                               <p:par>
-                                <p:cTn id="58" presetID="10" presetClass="exit" presetSubtype="0" fill="hold" nodeType="withEffect">
+                                <p:cTn id="56" presetID="10" presetClass="exit" presetSubtype="0" fill="hold" nodeType="withEffect">
                                   <p:stCondLst>
                                     <p:cond delay="750"/>
                                   </p:stCondLst>
                                   <p:childTnLst>
                                     <p:animEffect transition="out" filter="fade">
                                       <p:cBhvr>
-                                        <p:cTn id="59" dur="500"/>
+                                        <p:cTn id="57" dur="500"/>
                                         <p:tgtEl>
                                           <p:spTgt spid="12"/>
                                         </p:tgtEl>
@@ -6151,7 +6171,7 @@
                                     </p:animEffect>
                                     <p:set>
                                       <p:cBhvr>
-                                        <p:cTn id="60" dur="1" fill="hold">
+                                        <p:cTn id="58" dur="1" fill="hold">
                                           <p:stCondLst>
                                             <p:cond delay="499"/>
                                           </p:stCondLst>
@@ -6361,6 +6381,9 @@
                     <p:cTn id="3" fill="hold">
                       <p:stCondLst>
                         <p:cond delay="indefinite"/>
+                        <p:cond evt="onBegin" delay="0">
+                          <p:tn val="2"/>
+                        </p:cond>
                       </p:stCondLst>
                       <p:childTnLst>
                         <p:par>
@@ -6370,7 +6393,7 @@
                             </p:stCondLst>
                             <p:childTnLst>
                               <p:par>
-                                <p:cTn id="5" presetID="10" presetClass="entr" presetSubtype="0" fill="hold" nodeType="clickEffect">
+                                <p:cTn id="5" presetID="10" presetClass="entr" presetSubtype="0" fill="hold" nodeType="withEffect">
                                   <p:stCondLst>
                                     <p:cond delay="0"/>
                                   </p:stCondLst>
@@ -7581,86 +7604,7 @@
   <p:timing>
     <p:tnLst>
       <p:par>
-        <p:cTn id="1" dur="indefinite" restart="never" nodeType="tmRoot">
-          <p:childTnLst>
-            <p:seq concurrent="1" nextAc="seek">
-              <p:cTn id="2" dur="indefinite" nodeType="mainSeq">
-                <p:childTnLst>
-                  <p:par>
-                    <p:cTn id="3" fill="hold">
-                      <p:stCondLst>
-                        <p:cond delay="indefinite"/>
-                        <p:cond evt="onBegin" delay="0">
-                          <p:tn val="2"/>
-                        </p:cond>
-                      </p:stCondLst>
-                      <p:childTnLst>
-                        <p:par>
-                          <p:cTn id="4" fill="hold">
-                            <p:stCondLst>
-                              <p:cond delay="0"/>
-                            </p:stCondLst>
-                            <p:childTnLst>
-                              <p:par>
-                                <p:cTn id="5" presetID="10" presetClass="entr" presetSubtype="0" fill="hold" nodeType="withEffect">
-                                  <p:stCondLst>
-                                    <p:cond delay="500"/>
-                                  </p:stCondLst>
-                                  <p:childTnLst>
-                                    <p:set>
-                                      <p:cBhvr>
-                                        <p:cTn id="6" dur="1" fill="hold">
-                                          <p:stCondLst>
-                                            <p:cond delay="0"/>
-                                          </p:stCondLst>
-                                        </p:cTn>
-                                        <p:tgtEl>
-                                          <p:spTgt spid="1028"/>
-                                        </p:tgtEl>
-                                        <p:attrNameLst>
-                                          <p:attrName>style.visibility</p:attrName>
-                                        </p:attrNameLst>
-                                      </p:cBhvr>
-                                      <p:to>
-                                        <p:strVal val="visible"/>
-                                      </p:to>
-                                    </p:set>
-                                    <p:animEffect transition="in" filter="fade">
-                                      <p:cBhvr>
-                                        <p:cTn id="7" dur="500"/>
-                                        <p:tgtEl>
-                                          <p:spTgt spid="1028"/>
-                                        </p:tgtEl>
-                                      </p:cBhvr>
-                                    </p:animEffect>
-                                  </p:childTnLst>
-                                </p:cTn>
-                              </p:par>
-                            </p:childTnLst>
-                          </p:cTn>
-                        </p:par>
-                      </p:childTnLst>
-                    </p:cTn>
-                  </p:par>
-                </p:childTnLst>
-              </p:cTn>
-              <p:prevCondLst>
-                <p:cond evt="onPrev" delay="0">
-                  <p:tgtEl>
-                    <p:sldTgt/>
-                  </p:tgtEl>
-                </p:cond>
-              </p:prevCondLst>
-              <p:nextCondLst>
-                <p:cond evt="onNext" delay="0">
-                  <p:tgtEl>
-                    <p:sldTgt/>
-                  </p:tgtEl>
-                </p:cond>
-              </p:nextCondLst>
-            </p:seq>
-          </p:childTnLst>
-        </p:cTn>
+        <p:cTn id="1" dur="indefinite" restart="never" nodeType="tmRoot"/>
       </p:par>
     </p:tnLst>
   </p:timing>

</xml_diff>

<commit_message>
Added research result matrix to thesis
</commit_message>
<xml_diff>
--- a/presentations/20160128 Final presentation/WebRTC_Final.pptx
+++ b/presentations/20160128 Final presentation/WebRTC_Final.pptx
@@ -116,7 +116,7 @@
   </p:defaultTextStyle>
   <p:extLst>
     <p:ext uri="{EFAFB233-063F-42B5-8137-9DF3F51BA10A}">
-      <p15:sldGuideLst xmlns="" xmlns:p15="http://schemas.microsoft.com/office/powerpoint/2012/main">
+      <p15:sldGuideLst xmlns:p15="http://schemas.microsoft.com/office/powerpoint/2012/main" xmlns="">
         <p15:guide id="1" orient="horz" pos="1002">
           <p15:clr>
             <a:srgbClr val="A4A3A4"/>
@@ -215,7 +215,7 @@
           <a:p>
             <a:fld id="{7A19BEE0-598C-4858-A439-753E34679212}" type="datetimeFigureOut">
               <a:rPr lang="de-AT" smtClean="0"/>
-              <a:t>25.01.2016</a:t>
+              <a:t>26.01.2016</a:t>
             </a:fld>
             <a:endParaRPr lang="de-AT"/>
           </a:p>
@@ -1947,7 +1947,7 @@
           <a:p>
             <a:fld id="{BD334F44-700B-E44C-96AB-E83A6820DFD3}" type="datetimeFigureOut">
               <a:rPr lang="de-DE" smtClean="0"/>
-              <a:t>25.01.2016</a:t>
+              <a:t>26.01.2016</a:t>
             </a:fld>
             <a:endParaRPr lang="de-DE"/>
           </a:p>
@@ -2127,7 +2127,7 @@
           <a:p>
             <a:fld id="{BD334F44-700B-E44C-96AB-E83A6820DFD3}" type="datetimeFigureOut">
               <a:rPr lang="de-DE" smtClean="0"/>
-              <a:t>25.01.2016</a:t>
+              <a:t>26.01.2016</a:t>
             </a:fld>
             <a:endParaRPr lang="de-DE"/>
           </a:p>
@@ -2297,7 +2297,7 @@
           <a:p>
             <a:fld id="{BD334F44-700B-E44C-96AB-E83A6820DFD3}" type="datetimeFigureOut">
               <a:rPr lang="de-DE" smtClean="0"/>
-              <a:t>25.01.2016</a:t>
+              <a:t>26.01.2016</a:t>
             </a:fld>
             <a:endParaRPr lang="de-DE"/>
           </a:p>
@@ -2543,7 +2543,7 @@
           <a:p>
             <a:fld id="{BD334F44-700B-E44C-96AB-E83A6820DFD3}" type="datetimeFigureOut">
               <a:rPr lang="de-DE" smtClean="0"/>
-              <a:t>25.01.2016</a:t>
+              <a:t>26.01.2016</a:t>
             </a:fld>
             <a:endParaRPr lang="de-DE"/>
           </a:p>
@@ -2831,7 +2831,7 @@
           <a:p>
             <a:fld id="{BD334F44-700B-E44C-96AB-E83A6820DFD3}" type="datetimeFigureOut">
               <a:rPr lang="de-DE" smtClean="0"/>
-              <a:t>25.01.2016</a:t>
+              <a:t>26.01.2016</a:t>
             </a:fld>
             <a:endParaRPr lang="de-DE"/>
           </a:p>
@@ -3253,7 +3253,7 @@
           <a:p>
             <a:fld id="{BD334F44-700B-E44C-96AB-E83A6820DFD3}" type="datetimeFigureOut">
               <a:rPr lang="de-DE" smtClean="0"/>
-              <a:t>25.01.2016</a:t>
+              <a:t>26.01.2016</a:t>
             </a:fld>
             <a:endParaRPr lang="de-DE"/>
           </a:p>
@@ -3371,7 +3371,7 @@
           <a:p>
             <a:fld id="{BD334F44-700B-E44C-96AB-E83A6820DFD3}" type="datetimeFigureOut">
               <a:rPr lang="de-DE" smtClean="0"/>
-              <a:t>25.01.2016</a:t>
+              <a:t>26.01.2016</a:t>
             </a:fld>
             <a:endParaRPr lang="de-DE"/>
           </a:p>
@@ -3466,7 +3466,7 @@
           <a:p>
             <a:fld id="{BD334F44-700B-E44C-96AB-E83A6820DFD3}" type="datetimeFigureOut">
               <a:rPr lang="de-DE" smtClean="0"/>
-              <a:t>25.01.2016</a:t>
+              <a:t>26.01.2016</a:t>
             </a:fld>
             <a:endParaRPr lang="de-DE"/>
           </a:p>
@@ -3789,7 +3789,7 @@
           <a:p>
             <a:fld id="{BD334F44-700B-E44C-96AB-E83A6820DFD3}" type="datetimeFigureOut">
               <a:rPr lang="de-DE" smtClean="0"/>
-              <a:t>25.01.2016</a:t>
+              <a:t>26.01.2016</a:t>
             </a:fld>
             <a:endParaRPr lang="de-DE"/>
           </a:p>
@@ -4042,7 +4042,7 @@
           <a:p>
             <a:fld id="{BD334F44-700B-E44C-96AB-E83A6820DFD3}" type="datetimeFigureOut">
               <a:rPr lang="de-DE" smtClean="0"/>
-              <a:t>25.01.2016</a:t>
+              <a:t>26.01.2016</a:t>
             </a:fld>
             <a:endParaRPr lang="de-DE"/>
           </a:p>
@@ -4255,7 +4255,7 @@
           <a:p>
             <a:fld id="{BD334F44-700B-E44C-96AB-E83A6820DFD3}" type="datetimeFigureOut">
               <a:rPr lang="de-DE" smtClean="0"/>
-              <a:t>25.01.2016</a:t>
+              <a:t>26.01.2016</a:t>
             </a:fld>
             <a:endParaRPr lang="de-DE"/>
           </a:p>
@@ -7672,39 +7672,7 @@
                   <a:schemeClr val="bg1"/>
                 </a:solidFill>
               </a:rPr>
-              <a:t>for</a:t>
-            </a:r>
-            <a:r>
-              <a:rPr lang="de-DE" sz="5400" b="1" dirty="0" smtClean="0">
-                <a:solidFill>
-                  <a:schemeClr val="bg1"/>
-                </a:solidFill>
-              </a:rPr>
-              <a:t> </a:t>
-            </a:r>
-            <a:r>
-              <a:rPr lang="de-DE" sz="5400" b="1" dirty="0" err="1" smtClean="0">
-                <a:solidFill>
-                  <a:schemeClr val="bg1"/>
-                </a:solidFill>
-              </a:rPr>
-              <a:t>your</a:t>
-            </a:r>
-            <a:r>
-              <a:rPr lang="de-DE" sz="5400" b="1" dirty="0" smtClean="0">
-                <a:solidFill>
-                  <a:schemeClr val="bg1"/>
-                </a:solidFill>
-              </a:rPr>
-              <a:t> </a:t>
-            </a:r>
-            <a:r>
-              <a:rPr lang="de-DE" sz="5400" b="1" dirty="0" err="1" smtClean="0">
-                <a:solidFill>
-                  <a:schemeClr val="bg1"/>
-                </a:solidFill>
-              </a:rPr>
-              <a:t>attention</a:t>
+              <a:t>you</a:t>
             </a:r>
             <a:r>
               <a:rPr lang="de-DE" sz="5400" b="1" dirty="0" smtClean="0">

</xml_diff>